<commit_message>
Adjustments and Example Provided
</commit_message>
<xml_diff>
--- a/Template.pptx
+++ b/Template.pptx
@@ -243,7 +243,7 @@
           <a:p>
             <a:fld id="{CEA20838-168E-4F9F-A3C7-3F1CB847789B}" type="datetimeFigureOut">
               <a:rPr lang="en-US" smtClean="0"/>
-              <a:t>6/8/2023</a:t>
+              <a:t>3/24/2024</a:t>
             </a:fld>
             <a:endParaRPr lang="en-US"/>
           </a:p>
@@ -413,7 +413,7 @@
           <a:p>
             <a:fld id="{CEA20838-168E-4F9F-A3C7-3F1CB847789B}" type="datetimeFigureOut">
               <a:rPr lang="en-US" smtClean="0"/>
-              <a:t>6/8/2023</a:t>
+              <a:t>3/24/2024</a:t>
             </a:fld>
             <a:endParaRPr lang="en-US"/>
           </a:p>
@@ -593,7 +593,7 @@
           <a:p>
             <a:fld id="{CEA20838-168E-4F9F-A3C7-3F1CB847789B}" type="datetimeFigureOut">
               <a:rPr lang="en-US" smtClean="0"/>
-              <a:t>6/8/2023</a:t>
+              <a:t>3/24/2024</a:t>
             </a:fld>
             <a:endParaRPr lang="en-US"/>
           </a:p>
@@ -763,7 +763,7 @@
           <a:p>
             <a:fld id="{CEA20838-168E-4F9F-A3C7-3F1CB847789B}" type="datetimeFigureOut">
               <a:rPr lang="en-US" smtClean="0"/>
-              <a:t>6/8/2023</a:t>
+              <a:t>3/24/2024</a:t>
             </a:fld>
             <a:endParaRPr lang="en-US"/>
           </a:p>
@@ -1007,7 +1007,7 @@
           <a:p>
             <a:fld id="{CEA20838-168E-4F9F-A3C7-3F1CB847789B}" type="datetimeFigureOut">
               <a:rPr lang="en-US" smtClean="0"/>
-              <a:t>6/8/2023</a:t>
+              <a:t>3/24/2024</a:t>
             </a:fld>
             <a:endParaRPr lang="en-US"/>
           </a:p>
@@ -1239,7 +1239,7 @@
           <a:p>
             <a:fld id="{CEA20838-168E-4F9F-A3C7-3F1CB847789B}" type="datetimeFigureOut">
               <a:rPr lang="en-US" smtClean="0"/>
-              <a:t>6/8/2023</a:t>
+              <a:t>3/24/2024</a:t>
             </a:fld>
             <a:endParaRPr lang="en-US"/>
           </a:p>
@@ -1606,7 +1606,7 @@
           <a:p>
             <a:fld id="{CEA20838-168E-4F9F-A3C7-3F1CB847789B}" type="datetimeFigureOut">
               <a:rPr lang="en-US" smtClean="0"/>
-              <a:t>6/8/2023</a:t>
+              <a:t>3/24/2024</a:t>
             </a:fld>
             <a:endParaRPr lang="en-US"/>
           </a:p>
@@ -1724,7 +1724,7 @@
           <a:p>
             <a:fld id="{CEA20838-168E-4F9F-A3C7-3F1CB847789B}" type="datetimeFigureOut">
               <a:rPr lang="en-US" smtClean="0"/>
-              <a:t>6/8/2023</a:t>
+              <a:t>3/24/2024</a:t>
             </a:fld>
             <a:endParaRPr lang="en-US"/>
           </a:p>
@@ -1819,7 +1819,7 @@
           <a:p>
             <a:fld id="{CEA20838-168E-4F9F-A3C7-3F1CB847789B}" type="datetimeFigureOut">
               <a:rPr lang="en-US" smtClean="0"/>
-              <a:t>6/8/2023</a:t>
+              <a:t>3/24/2024</a:t>
             </a:fld>
             <a:endParaRPr lang="en-US"/>
           </a:p>
@@ -2096,7 +2096,7 @@
           <a:p>
             <a:fld id="{CEA20838-168E-4F9F-A3C7-3F1CB847789B}" type="datetimeFigureOut">
               <a:rPr lang="en-US" smtClean="0"/>
-              <a:t>6/8/2023</a:t>
+              <a:t>3/24/2024</a:t>
             </a:fld>
             <a:endParaRPr lang="en-US"/>
           </a:p>
@@ -2353,7 +2353,7 @@
           <a:p>
             <a:fld id="{CEA20838-168E-4F9F-A3C7-3F1CB847789B}" type="datetimeFigureOut">
               <a:rPr lang="en-US" smtClean="0"/>
-              <a:t>6/8/2023</a:t>
+              <a:t>3/24/2024</a:t>
             </a:fld>
             <a:endParaRPr lang="en-US"/>
           </a:p>
@@ -2566,7 +2566,7 @@
           <a:p>
             <a:fld id="{CEA20838-168E-4F9F-A3C7-3F1CB847789B}" type="datetimeFigureOut">
               <a:rPr lang="en-US" smtClean="0"/>
-              <a:t>6/8/2023</a:t>
+              <a:t>3/24/2024</a:t>
             </a:fld>
             <a:endParaRPr lang="en-US"/>
           </a:p>
@@ -3134,72 +3134,6 @@
       </p:pic>
       <p:sp>
         <p:nvSpPr>
-          <p:cNvPr id="14" name="TextBox 13">
-            <a:extLst>
-              <a:ext uri="{FF2B5EF4-FFF2-40B4-BE49-F238E27FC236}">
-                <a16:creationId xmlns:a16="http://schemas.microsoft.com/office/drawing/2014/main" id="{2FCFD4AD-CA92-45E9-3AFE-4069D6AED9FE}"/>
-              </a:ext>
-            </a:extLst>
-          </p:cNvPr>
-          <p:cNvSpPr txBox="1"/>
-          <p:nvPr/>
-        </p:nvSpPr>
-        <p:spPr>
-          <a:xfrm>
-            <a:off x="699851" y="7387250"/>
-            <a:ext cx="2819529" cy="400110"/>
-          </a:xfrm>
-          <a:prstGeom prst="rect">
-            <a:avLst/>
-          </a:prstGeom>
-          <a:noFill/>
-        </p:spPr>
-        <p:txBody>
-          <a:bodyPr wrap="square" rtlCol="0">
-            <a:spAutoFit/>
-          </a:bodyPr>
-          <a:lstStyle/>
-          <a:p>
-            <a:r>
-              <a:rPr lang="en-US" sz="1000" dirty="0">
-                <a:latin typeface="Beaver Bold" pitchFamily="50" charset="0"/>
-                <a:cs typeface="Times New Roman" panose="02020603050405020304" pitchFamily="18" charset="0"/>
-              </a:rPr>
-              <a:t>Charts and top table Does not include </a:t>
-            </a:r>
-            <a:r>
-              <a:rPr lang="en-US" sz="1000" dirty="0">
-                <a:latin typeface="Avenir Next LT Pro Demi" panose="020B0704020202020204" pitchFamily="34" charset="0"/>
-                <a:cs typeface="Times New Roman" panose="02020603050405020304" pitchFamily="18" charset="0"/>
-              </a:rPr>
-              <a:t>@</a:t>
-            </a:r>
-            <a:r>
-              <a:rPr lang="en-US" sz="1000" dirty="0">
-                <a:latin typeface="Beaver Bold" pitchFamily="50" charset="0"/>
-                <a:cs typeface="Times New Roman" panose="02020603050405020304" pitchFamily="18" charset="0"/>
-              </a:rPr>
-              <a:t> ASU </a:t>
-            </a:r>
-            <a:r>
-              <a:rPr lang="en-US" sz="1000" dirty="0">
-                <a:latin typeface="Avenir Next LT Pro Demi" panose="020B0704020202020204" pitchFamily="34" charset="0"/>
-                <a:cs typeface="Times New Roman" panose="02020603050405020304" pitchFamily="18" charset="0"/>
-              </a:rPr>
-              <a:t>@</a:t>
-            </a:r>
-            <a:r>
-              <a:rPr lang="en-US" sz="1000" dirty="0">
-                <a:latin typeface="Beaver Bold" pitchFamily="50" charset="0"/>
-                <a:cs typeface="Times New Roman" panose="02020603050405020304" pitchFamily="18" charset="0"/>
-              </a:rPr>
-              <a:t> GCU and Regionals</a:t>
-            </a:r>
-          </a:p>
-        </p:txBody>
-      </p:sp>
-      <p:sp>
-        <p:nvSpPr>
           <p:cNvPr id="4" name="TextBox 3">
             <a:extLst>
               <a:ext uri="{FF2B5EF4-FFF2-40B4-BE49-F238E27FC236}">

</xml_diff>